<commit_message>
Update VDMS arch figure
</commit_message>
<xml_diff>
--- a/yfcc100m/paper/figures/vdms_arch.pptx
+++ b/yfcc100m/paper/figures/vdms_arch.pptx
@@ -6,6 +6,7 @@
   </p:sldMasterIdLst>
   <p:sldIdLst>
     <p:sldId id="1447" r:id="rId2"/>
+    <p:sldId id="1448" r:id="rId3"/>
   </p:sldIdLst>
   <p:sldSz cx="7315200" cy="4572000"/>
   <p:notesSz cx="6858000" cy="9144000"/>
@@ -104,6 +105,11 @@
       </a:defRPr>
     </a:lvl9pPr>
   </p:defaultTextStyle>
+  <p:extLst>
+    <p:ext uri="{EFAFB233-063F-42B5-8137-9DF3F51BA10A}">
+      <p15:sldGuideLst xmlns:p15="http://schemas.microsoft.com/office/powerpoint/2012/main"/>
+    </p:ext>
+  </p:extLst>
 </p:presentation>
 </file>
 
@@ -238,7 +244,7 @@
           <a:p>
             <a:fld id="{D760344E-94CD-944A-AD0E-C122FCE4D184}" type="datetimeFigureOut">
               <a:rPr lang="en-US" smtClean="0"/>
-              <a:t>1/14/20</a:t>
+              <a:t>2/22/21</a:t>
             </a:fld>
             <a:endParaRPr lang="en-US"/>
           </a:p>
@@ -408,7 +414,7 @@
           <a:p>
             <a:fld id="{D760344E-94CD-944A-AD0E-C122FCE4D184}" type="datetimeFigureOut">
               <a:rPr lang="en-US" smtClean="0"/>
-              <a:t>1/14/20</a:t>
+              <a:t>2/22/21</a:t>
             </a:fld>
             <a:endParaRPr lang="en-US"/>
           </a:p>
@@ -588,7 +594,7 @@
           <a:p>
             <a:fld id="{D760344E-94CD-944A-AD0E-C122FCE4D184}" type="datetimeFigureOut">
               <a:rPr lang="en-US" smtClean="0"/>
-              <a:t>1/14/20</a:t>
+              <a:t>2/22/21</a:t>
             </a:fld>
             <a:endParaRPr lang="en-US"/>
           </a:p>
@@ -758,7 +764,7 @@
           <a:p>
             <a:fld id="{D760344E-94CD-944A-AD0E-C122FCE4D184}" type="datetimeFigureOut">
               <a:rPr lang="en-US" smtClean="0"/>
-              <a:t>1/14/20</a:t>
+              <a:t>2/22/21</a:t>
             </a:fld>
             <a:endParaRPr lang="en-US"/>
           </a:p>
@@ -1004,7 +1010,7 @@
           <a:p>
             <a:fld id="{D760344E-94CD-944A-AD0E-C122FCE4D184}" type="datetimeFigureOut">
               <a:rPr lang="en-US" smtClean="0"/>
-              <a:t>1/14/20</a:t>
+              <a:t>2/22/21</a:t>
             </a:fld>
             <a:endParaRPr lang="en-US"/>
           </a:p>
@@ -1236,7 +1242,7 @@
           <a:p>
             <a:fld id="{D760344E-94CD-944A-AD0E-C122FCE4D184}" type="datetimeFigureOut">
               <a:rPr lang="en-US" smtClean="0"/>
-              <a:t>1/14/20</a:t>
+              <a:t>2/22/21</a:t>
             </a:fld>
             <a:endParaRPr lang="en-US"/>
           </a:p>
@@ -1603,7 +1609,7 @@
           <a:p>
             <a:fld id="{D760344E-94CD-944A-AD0E-C122FCE4D184}" type="datetimeFigureOut">
               <a:rPr lang="en-US" smtClean="0"/>
-              <a:t>1/14/20</a:t>
+              <a:t>2/22/21</a:t>
             </a:fld>
             <a:endParaRPr lang="en-US"/>
           </a:p>
@@ -1721,7 +1727,7 @@
           <a:p>
             <a:fld id="{D760344E-94CD-944A-AD0E-C122FCE4D184}" type="datetimeFigureOut">
               <a:rPr lang="en-US" smtClean="0"/>
-              <a:t>1/14/20</a:t>
+              <a:t>2/22/21</a:t>
             </a:fld>
             <a:endParaRPr lang="en-US"/>
           </a:p>
@@ -1816,7 +1822,7 @@
           <a:p>
             <a:fld id="{D760344E-94CD-944A-AD0E-C122FCE4D184}" type="datetimeFigureOut">
               <a:rPr lang="en-US" smtClean="0"/>
-              <a:t>1/14/20</a:t>
+              <a:t>2/22/21</a:t>
             </a:fld>
             <a:endParaRPr lang="en-US"/>
           </a:p>
@@ -2093,7 +2099,7 @@
           <a:p>
             <a:fld id="{D760344E-94CD-944A-AD0E-C122FCE4D184}" type="datetimeFigureOut">
               <a:rPr lang="en-US" smtClean="0"/>
-              <a:t>1/14/20</a:t>
+              <a:t>2/22/21</a:t>
             </a:fld>
             <a:endParaRPr lang="en-US"/>
           </a:p>
@@ -2350,7 +2356,7 @@
           <a:p>
             <a:fld id="{D760344E-94CD-944A-AD0E-C122FCE4D184}" type="datetimeFigureOut">
               <a:rPr lang="en-US" smtClean="0"/>
-              <a:t>1/14/20</a:t>
+              <a:t>2/22/21</a:t>
             </a:fld>
             <a:endParaRPr lang="en-US"/>
           </a:p>
@@ -2563,7 +2569,7 @@
           <a:p>
             <a:fld id="{D760344E-94CD-944A-AD0E-C122FCE4D184}" type="datetimeFigureOut">
               <a:rPr lang="en-US" smtClean="0"/>
-              <a:t>1/14/20</a:t>
+              <a:t>2/22/21</a:t>
             </a:fld>
             <a:endParaRPr lang="en-US"/>
           </a:p>
@@ -3846,6 +3852,720 @@
 </p:sld>
 </file>
 
+<file path=ppt/slides/slide2.xml><?xml version="1.0" encoding="utf-8"?>
+<p:sld xmlns:a="http://schemas.openxmlformats.org/drawingml/2006/main" xmlns:r="http://schemas.openxmlformats.org/officeDocument/2006/relationships" xmlns:p="http://schemas.openxmlformats.org/presentationml/2006/main">
+  <p:cSld>
+    <p:spTree>
+      <p:nvGrpSpPr>
+        <p:cNvPr id="1" name=""/>
+        <p:cNvGrpSpPr/>
+        <p:nvPr/>
+      </p:nvGrpSpPr>
+      <p:grpSpPr>
+        <a:xfrm>
+          <a:off x="0" y="0"/>
+          <a:ext cx="0" cy="0"/>
+          <a:chOff x="0" y="0"/>
+          <a:chExt cx="0" cy="0"/>
+        </a:xfrm>
+      </p:grpSpPr>
+      <p:sp>
+        <p:nvSpPr>
+          <p:cNvPr id="34" name="Rectangle 33">
+            <a:extLst>
+              <a:ext uri="{FF2B5EF4-FFF2-40B4-BE49-F238E27FC236}">
+                <a16:creationId xmlns:a16="http://schemas.microsoft.com/office/drawing/2014/main" id="{5B322239-E5C0-6A47-87ED-50DA6742C94F}"/>
+              </a:ext>
+            </a:extLst>
+          </p:cNvPr>
+          <p:cNvSpPr/>
+          <p:nvPr/>
+        </p:nvSpPr>
+        <p:spPr>
+          <a:xfrm>
+            <a:off x="456660" y="2664075"/>
+            <a:ext cx="2136473" cy="370380"/>
+          </a:xfrm>
+          <a:prstGeom prst="rect">
+            <a:avLst/>
+          </a:prstGeom>
+          <a:solidFill>
+            <a:srgbClr val="70AD47">
+              <a:lumMod val="75000"/>
+            </a:srgbClr>
+          </a:solidFill>
+          <a:ln w="12700" cap="flat" cmpd="sng" algn="ctr">
+            <a:solidFill>
+              <a:srgbClr val="5B9BD5">
+                <a:shade val="50000"/>
+              </a:srgbClr>
+            </a:solidFill>
+            <a:prstDash val="solid"/>
+            <a:miter lim="800000"/>
+          </a:ln>
+          <a:effectLst/>
+        </p:spPr>
+        <p:txBody>
+          <a:bodyPr rtlCol="0" anchor="ctr"/>
+          <a:lstStyle/>
+          <a:p>
+            <a:pPr algn="ctr" defTabSz="1219170">
+              <a:defRPr/>
+            </a:pPr>
+            <a:r>
+              <a:rPr lang="en-US" sz="1867" kern="0" dirty="0">
+                <a:solidFill>
+                  <a:prstClr val="white"/>
+                </a:solidFill>
+                <a:latin typeface="Calibri" panose="020F0502020204030204"/>
+              </a:rPr>
+              <a:t>TileDB</a:t>
+            </a:r>
+          </a:p>
+        </p:txBody>
+      </p:sp>
+      <p:pic>
+        <p:nvPicPr>
+          <p:cNvPr id="35" name="Picture 34">
+            <a:extLst>
+              <a:ext uri="{FF2B5EF4-FFF2-40B4-BE49-F238E27FC236}">
+                <a16:creationId xmlns:a16="http://schemas.microsoft.com/office/drawing/2014/main" id="{608AB0EF-498F-1E4E-B7B1-D8EBF4D34AB3}"/>
+              </a:ext>
+            </a:extLst>
+          </p:cNvPr>
+          <p:cNvPicPr>
+            <a:picLocks noChangeAspect="1"/>
+          </p:cNvPicPr>
+          <p:nvPr/>
+        </p:nvPicPr>
+        <p:blipFill rotWithShape="1">
+          <a:blip r:embed="rId2" cstate="print">
+            <a:duotone>
+              <a:srgbClr val="70AD47">
+                <a:shade val="45000"/>
+                <a:satMod val="135000"/>
+              </a:srgbClr>
+              <a:prstClr val="white"/>
+            </a:duotone>
+            <a:extLst>
+              <a:ext uri="{28A0092B-C50C-407E-A947-70E740481C1C}">
+                <a14:useLocalDpi xmlns:a14="http://schemas.microsoft.com/office/drawing/2010/main" val="0"/>
+              </a:ext>
+            </a:extLst>
+          </a:blip>
+          <a:srcRect/>
+          <a:stretch/>
+        </p:blipFill>
+        <p:spPr>
+          <a:xfrm>
+            <a:off x="758874" y="1382194"/>
+            <a:ext cx="991395" cy="812447"/>
+          </a:xfrm>
+          <a:prstGeom prst="rect">
+            <a:avLst/>
+          </a:prstGeom>
+        </p:spPr>
+      </p:pic>
+      <p:sp>
+        <p:nvSpPr>
+          <p:cNvPr id="36" name="Rectangle 35">
+            <a:extLst>
+              <a:ext uri="{FF2B5EF4-FFF2-40B4-BE49-F238E27FC236}">
+                <a16:creationId xmlns:a16="http://schemas.microsoft.com/office/drawing/2014/main" id="{E718F259-0ABF-FD48-998B-CB97F0684250}"/>
+              </a:ext>
+            </a:extLst>
+          </p:cNvPr>
+          <p:cNvSpPr/>
+          <p:nvPr/>
+        </p:nvSpPr>
+        <p:spPr>
+          <a:xfrm>
+            <a:off x="4838806" y="2286322"/>
+            <a:ext cx="2033805" cy="748134"/>
+          </a:xfrm>
+          <a:prstGeom prst="rect">
+            <a:avLst/>
+          </a:prstGeom>
+          <a:solidFill>
+            <a:srgbClr val="70AD47">
+              <a:lumMod val="75000"/>
+            </a:srgbClr>
+          </a:solidFill>
+          <a:ln w="12700" cap="flat" cmpd="sng" algn="ctr">
+            <a:solidFill>
+              <a:srgbClr val="5B9BD5">
+                <a:shade val="50000"/>
+              </a:srgbClr>
+            </a:solidFill>
+            <a:prstDash val="solid"/>
+            <a:miter lim="800000"/>
+          </a:ln>
+          <a:effectLst/>
+        </p:spPr>
+        <p:txBody>
+          <a:bodyPr lIns="0" rIns="0" rtlCol="0" anchor="ctr"/>
+          <a:lstStyle/>
+          <a:p>
+            <a:pPr algn="ctr" defTabSz="1219170">
+              <a:defRPr/>
+            </a:pPr>
+            <a:r>
+              <a:rPr lang="en-US" sz="1867" kern="0" dirty="0">
+                <a:solidFill>
+                  <a:prstClr val="white"/>
+                </a:solidFill>
+                <a:latin typeface="Calibri" panose="020F0502020204030204"/>
+              </a:rPr>
+              <a:t>Persistent Memory</a:t>
+            </a:r>
+          </a:p>
+          <a:p>
+            <a:pPr algn="ctr" defTabSz="1219170">
+              <a:defRPr/>
+            </a:pPr>
+            <a:r>
+              <a:rPr lang="en-US" sz="1867" kern="0" dirty="0">
+                <a:solidFill>
+                  <a:prstClr val="white"/>
+                </a:solidFill>
+                <a:latin typeface="Calibri" panose="020F0502020204030204"/>
+              </a:rPr>
+              <a:t>Graph DB</a:t>
+            </a:r>
+          </a:p>
+        </p:txBody>
+      </p:sp>
+      <p:sp>
+        <p:nvSpPr>
+          <p:cNvPr id="37" name="Rectangle 36">
+            <a:extLst>
+              <a:ext uri="{FF2B5EF4-FFF2-40B4-BE49-F238E27FC236}">
+                <a16:creationId xmlns:a16="http://schemas.microsoft.com/office/drawing/2014/main" id="{39BD475E-AFA0-C047-A8D9-B93D24B111B6}"/>
+              </a:ext>
+            </a:extLst>
+          </p:cNvPr>
+          <p:cNvSpPr/>
+          <p:nvPr/>
+        </p:nvSpPr>
+        <p:spPr>
+          <a:xfrm>
+            <a:off x="442589" y="186461"/>
+            <a:ext cx="6404775" cy="636294"/>
+          </a:xfrm>
+          <a:prstGeom prst="rect">
+            <a:avLst/>
+          </a:prstGeom>
+          <a:solidFill>
+            <a:srgbClr val="5B9BD5"/>
+          </a:solidFill>
+          <a:ln w="12700" cap="flat" cmpd="sng" algn="ctr">
+            <a:solidFill>
+              <a:srgbClr val="5B9BD5">
+                <a:shade val="50000"/>
+              </a:srgbClr>
+            </a:solidFill>
+            <a:prstDash val="solid"/>
+            <a:miter lim="800000"/>
+          </a:ln>
+          <a:effectLst/>
+        </p:spPr>
+        <p:txBody>
+          <a:bodyPr rtlCol="0" anchor="ctr"/>
+          <a:lstStyle/>
+          <a:p>
+            <a:pPr algn="ctr" defTabSz="1219170">
+              <a:defRPr/>
+            </a:pPr>
+            <a:r>
+              <a:rPr lang="en-US" sz="1867" kern="0" dirty="0">
+                <a:solidFill>
+                  <a:prstClr val="white"/>
+                </a:solidFill>
+                <a:latin typeface="Calibri" panose="020F0502020204030204"/>
+              </a:rPr>
+              <a:t>Applications</a:t>
+            </a:r>
+          </a:p>
+        </p:txBody>
+      </p:sp>
+      <p:sp>
+        <p:nvSpPr>
+          <p:cNvPr id="39" name="Rectangle 38">
+            <a:extLst>
+              <a:ext uri="{FF2B5EF4-FFF2-40B4-BE49-F238E27FC236}">
+                <a16:creationId xmlns:a16="http://schemas.microsoft.com/office/drawing/2014/main" id="{DE0A367F-DA2A-6644-8636-B23898AC4165}"/>
+              </a:ext>
+            </a:extLst>
+          </p:cNvPr>
+          <p:cNvSpPr/>
+          <p:nvPr/>
+        </p:nvSpPr>
+        <p:spPr>
+          <a:xfrm>
+            <a:off x="2647734" y="2664075"/>
+            <a:ext cx="2136473" cy="370380"/>
+          </a:xfrm>
+          <a:prstGeom prst="rect">
+            <a:avLst/>
+          </a:prstGeom>
+          <a:solidFill>
+            <a:srgbClr val="70AD47">
+              <a:lumMod val="75000"/>
+            </a:srgbClr>
+          </a:solidFill>
+          <a:ln w="12700" cap="flat" cmpd="sng" algn="ctr">
+            <a:solidFill>
+              <a:srgbClr val="5B9BD5">
+                <a:shade val="50000"/>
+              </a:srgbClr>
+            </a:solidFill>
+            <a:prstDash val="solid"/>
+            <a:miter lim="800000"/>
+          </a:ln>
+          <a:effectLst/>
+        </p:spPr>
+        <p:txBody>
+          <a:bodyPr rtlCol="0" anchor="ctr"/>
+          <a:lstStyle/>
+          <a:p>
+            <a:pPr algn="ctr" defTabSz="1219170">
+              <a:defRPr/>
+            </a:pPr>
+            <a:r>
+              <a:rPr lang="en-US" sz="1867" kern="0" dirty="0">
+                <a:solidFill>
+                  <a:prstClr val="white"/>
+                </a:solidFill>
+                <a:latin typeface="Calibri" panose="020F0502020204030204"/>
+              </a:rPr>
+              <a:t>OpenCV</a:t>
+            </a:r>
+          </a:p>
+        </p:txBody>
+      </p:sp>
+      <p:pic>
+        <p:nvPicPr>
+          <p:cNvPr id="40" name="Picture 39">
+            <a:extLst>
+              <a:ext uri="{FF2B5EF4-FFF2-40B4-BE49-F238E27FC236}">
+                <a16:creationId xmlns:a16="http://schemas.microsoft.com/office/drawing/2014/main" id="{412C85FE-EA1E-E541-A4B7-C2CED1F7A5CF}"/>
+              </a:ext>
+            </a:extLst>
+          </p:cNvPr>
+          <p:cNvPicPr>
+            <a:picLocks noChangeAspect="1"/>
+          </p:cNvPicPr>
+          <p:nvPr/>
+        </p:nvPicPr>
+        <p:blipFill>
+          <a:blip r:embed="rId3" cstate="print">
+            <a:duotone>
+              <a:srgbClr val="70AD47">
+                <a:shade val="45000"/>
+                <a:satMod val="135000"/>
+              </a:srgbClr>
+              <a:prstClr val="white"/>
+            </a:duotone>
+            <a:extLst>
+              <a:ext uri="{28A0092B-C50C-407E-A947-70E740481C1C}">
+                <a14:useLocalDpi xmlns:a14="http://schemas.microsoft.com/office/drawing/2010/main" val="0"/>
+              </a:ext>
+            </a:extLst>
+          </a:blip>
+          <a:stretch>
+            <a:fillRect/>
+          </a:stretch>
+        </p:blipFill>
+        <p:spPr>
+          <a:xfrm>
+            <a:off x="3582816" y="1385805"/>
+            <a:ext cx="985236" cy="812447"/>
+          </a:xfrm>
+          <a:prstGeom prst="rect">
+            <a:avLst/>
+          </a:prstGeom>
+        </p:spPr>
+      </p:pic>
+      <p:pic>
+        <p:nvPicPr>
+          <p:cNvPr id="41" name="Picture 40">
+            <a:extLst>
+              <a:ext uri="{FF2B5EF4-FFF2-40B4-BE49-F238E27FC236}">
+                <a16:creationId xmlns:a16="http://schemas.microsoft.com/office/drawing/2014/main" id="{713F72F5-F310-EF4C-920D-D6EEFF364474}"/>
+              </a:ext>
+            </a:extLst>
+          </p:cNvPr>
+          <p:cNvPicPr>
+            <a:picLocks noChangeAspect="1"/>
+          </p:cNvPicPr>
+          <p:nvPr/>
+        </p:nvPicPr>
+        <p:blipFill>
+          <a:blip r:embed="rId4" cstate="print">
+            <a:duotone>
+              <a:prstClr val="black"/>
+              <a:srgbClr val="70AD47">
+                <a:tint val="45000"/>
+                <a:satMod val="400000"/>
+              </a:srgbClr>
+            </a:duotone>
+            <a:extLst>
+              <a:ext uri="{28A0092B-C50C-407E-A947-70E740481C1C}">
+                <a14:useLocalDpi xmlns:a14="http://schemas.microsoft.com/office/drawing/2010/main" val="0"/>
+              </a:ext>
+            </a:extLst>
+          </a:blip>
+          <a:stretch>
+            <a:fillRect/>
+          </a:stretch>
+        </p:blipFill>
+        <p:spPr>
+          <a:xfrm>
+            <a:off x="5405658" y="1366461"/>
+            <a:ext cx="750083" cy="812447"/>
+          </a:xfrm>
+          <a:prstGeom prst="rect">
+            <a:avLst/>
+          </a:prstGeom>
+        </p:spPr>
+      </p:pic>
+      <p:pic>
+        <p:nvPicPr>
+          <p:cNvPr id="42" name="Picture 41">
+            <a:extLst>
+              <a:ext uri="{FF2B5EF4-FFF2-40B4-BE49-F238E27FC236}">
+                <a16:creationId xmlns:a16="http://schemas.microsoft.com/office/drawing/2014/main" id="{9001F5AA-0051-464F-B93A-E4150DC8652B}"/>
+              </a:ext>
+            </a:extLst>
+          </p:cNvPr>
+          <p:cNvPicPr>
+            <a:picLocks noChangeAspect="1"/>
+          </p:cNvPicPr>
+          <p:nvPr/>
+        </p:nvPicPr>
+        <p:blipFill rotWithShape="1">
+          <a:blip r:embed="rId5" cstate="print">
+            <a:duotone>
+              <a:srgbClr val="70AD47">
+                <a:shade val="45000"/>
+                <a:satMod val="135000"/>
+              </a:srgbClr>
+              <a:prstClr val="white"/>
+            </a:duotone>
+            <a:extLst>
+              <a:ext uri="{28A0092B-C50C-407E-A947-70E740481C1C}">
+                <a14:useLocalDpi xmlns:a14="http://schemas.microsoft.com/office/drawing/2010/main" val="0"/>
+              </a:ext>
+            </a:extLst>
+          </a:blip>
+          <a:srcRect t="26890" r="60350"/>
+          <a:stretch/>
+        </p:blipFill>
+        <p:spPr>
+          <a:xfrm>
+            <a:off x="2169072" y="1385805"/>
+            <a:ext cx="848122" cy="812447"/>
+          </a:xfrm>
+          <a:prstGeom prst="rect">
+            <a:avLst/>
+          </a:prstGeom>
+        </p:spPr>
+      </p:pic>
+      <p:sp>
+        <p:nvSpPr>
+          <p:cNvPr id="43" name="Rectangle 42">
+            <a:extLst>
+              <a:ext uri="{FF2B5EF4-FFF2-40B4-BE49-F238E27FC236}">
+                <a16:creationId xmlns:a16="http://schemas.microsoft.com/office/drawing/2014/main" id="{F658059A-50D7-3942-A4EA-DC8C78A18F59}"/>
+              </a:ext>
+            </a:extLst>
+          </p:cNvPr>
+          <p:cNvSpPr/>
+          <p:nvPr/>
+        </p:nvSpPr>
+        <p:spPr>
+          <a:xfrm>
+            <a:off x="442589" y="863799"/>
+            <a:ext cx="6404775" cy="424246"/>
+          </a:xfrm>
+          <a:prstGeom prst="rect">
+            <a:avLst/>
+          </a:prstGeom>
+          <a:solidFill>
+            <a:srgbClr val="70AD47">
+              <a:lumMod val="75000"/>
+            </a:srgbClr>
+          </a:solidFill>
+          <a:ln w="12700" cap="flat" cmpd="sng" algn="ctr">
+            <a:solidFill>
+              <a:srgbClr val="5B9BD5">
+                <a:shade val="50000"/>
+              </a:srgbClr>
+            </a:solidFill>
+            <a:prstDash val="solid"/>
+            <a:miter lim="800000"/>
+          </a:ln>
+          <a:effectLst/>
+        </p:spPr>
+        <p:txBody>
+          <a:bodyPr rtlCol="0" anchor="ctr"/>
+          <a:lstStyle/>
+          <a:p>
+            <a:pPr algn="ctr" defTabSz="1219170">
+              <a:defRPr/>
+            </a:pPr>
+            <a:r>
+              <a:rPr lang="en-US" sz="1867" kern="0" dirty="0">
+                <a:solidFill>
+                  <a:prstClr val="white"/>
+                </a:solidFill>
+                <a:latin typeface="Calibri" panose="020F0502020204030204"/>
+              </a:rPr>
+              <a:t>VDMS API</a:t>
+            </a:r>
+          </a:p>
+        </p:txBody>
+      </p:sp>
+      <p:sp>
+        <p:nvSpPr>
+          <p:cNvPr id="44" name="Rectangle 43">
+            <a:extLst>
+              <a:ext uri="{FF2B5EF4-FFF2-40B4-BE49-F238E27FC236}">
+                <a16:creationId xmlns:a16="http://schemas.microsoft.com/office/drawing/2014/main" id="{E3CD40A2-5F2D-B141-A6E0-581129D7DF59}"/>
+              </a:ext>
+            </a:extLst>
+          </p:cNvPr>
+          <p:cNvSpPr/>
+          <p:nvPr/>
+        </p:nvSpPr>
+        <p:spPr>
+          <a:xfrm>
+            <a:off x="456660" y="2286322"/>
+            <a:ext cx="4327546" cy="336709"/>
+          </a:xfrm>
+          <a:prstGeom prst="rect">
+            <a:avLst/>
+          </a:prstGeom>
+          <a:solidFill>
+            <a:srgbClr val="70AD47">
+              <a:lumMod val="75000"/>
+            </a:srgbClr>
+          </a:solidFill>
+          <a:ln w="12700" cap="flat" cmpd="sng" algn="ctr">
+            <a:solidFill>
+              <a:srgbClr val="5B9BD5">
+                <a:shade val="50000"/>
+              </a:srgbClr>
+            </a:solidFill>
+            <a:prstDash val="solid"/>
+            <a:miter lim="800000"/>
+          </a:ln>
+          <a:effectLst/>
+        </p:spPr>
+        <p:txBody>
+          <a:bodyPr rtlCol="0" anchor="ctr"/>
+          <a:lstStyle/>
+          <a:p>
+            <a:pPr algn="ctr" defTabSz="1219170">
+              <a:defRPr/>
+            </a:pPr>
+            <a:r>
+              <a:rPr lang="en-US" sz="1867" kern="0" dirty="0">
+                <a:solidFill>
+                  <a:prstClr val="white"/>
+                </a:solidFill>
+                <a:latin typeface="Calibri" panose="020F0502020204030204"/>
+              </a:rPr>
+              <a:t>Visual Compute Module</a:t>
+            </a:r>
+          </a:p>
+        </p:txBody>
+      </p:sp>
+      <p:sp>
+        <p:nvSpPr>
+          <p:cNvPr id="21" name="Rectangle 20">
+            <a:extLst>
+              <a:ext uri="{FF2B5EF4-FFF2-40B4-BE49-F238E27FC236}">
+                <a16:creationId xmlns:a16="http://schemas.microsoft.com/office/drawing/2014/main" id="{00F6447A-1318-D04B-AB3A-9A9ABACD397A}"/>
+              </a:ext>
+            </a:extLst>
+          </p:cNvPr>
+          <p:cNvSpPr/>
+          <p:nvPr/>
+        </p:nvSpPr>
+        <p:spPr>
+          <a:xfrm>
+            <a:off x="442589" y="3101238"/>
+            <a:ext cx="4341617" cy="649958"/>
+          </a:xfrm>
+          <a:prstGeom prst="rect">
+            <a:avLst/>
+          </a:prstGeom>
+          <a:solidFill>
+            <a:srgbClr val="70AD47">
+              <a:lumMod val="75000"/>
+            </a:srgbClr>
+          </a:solidFill>
+          <a:ln w="12700" cap="flat" cmpd="sng" algn="ctr">
+            <a:solidFill>
+              <a:srgbClr val="5B9BD5">
+                <a:shade val="50000"/>
+              </a:srgbClr>
+            </a:solidFill>
+            <a:prstDash val="solid"/>
+            <a:miter lim="800000"/>
+          </a:ln>
+          <a:effectLst/>
+        </p:spPr>
+        <p:txBody>
+          <a:bodyPr lIns="0" rIns="0" rtlCol="0" anchor="ctr"/>
+          <a:lstStyle/>
+          <a:p>
+            <a:pPr algn="ctr" defTabSz="1219170">
+              <a:defRPr/>
+            </a:pPr>
+            <a:r>
+              <a:rPr lang="en-US" sz="1867" kern="0" dirty="0">
+                <a:solidFill>
+                  <a:prstClr val="white"/>
+                </a:solidFill>
+                <a:latin typeface="Calibri" panose="020F0502020204030204"/>
+              </a:rPr>
+              <a:t>File System (Local or Distributed)</a:t>
+            </a:r>
+          </a:p>
+        </p:txBody>
+      </p:sp>
+      <p:sp>
+        <p:nvSpPr>
+          <p:cNvPr id="22" name="Rectangle 21">
+            <a:extLst>
+              <a:ext uri="{FF2B5EF4-FFF2-40B4-BE49-F238E27FC236}">
+                <a16:creationId xmlns:a16="http://schemas.microsoft.com/office/drawing/2014/main" id="{94C55277-20C1-ED42-B443-B9A54AB6A85A}"/>
+              </a:ext>
+            </a:extLst>
+          </p:cNvPr>
+          <p:cNvSpPr/>
+          <p:nvPr/>
+        </p:nvSpPr>
+        <p:spPr>
+          <a:xfrm>
+            <a:off x="4845983" y="3101238"/>
+            <a:ext cx="2033805" cy="649958"/>
+          </a:xfrm>
+          <a:prstGeom prst="rect">
+            <a:avLst/>
+          </a:prstGeom>
+          <a:noFill/>
+          <a:ln w="12700" cap="flat" cmpd="sng" algn="ctr">
+            <a:solidFill>
+              <a:srgbClr val="5B9BD5">
+                <a:shade val="50000"/>
+              </a:srgbClr>
+            </a:solidFill>
+            <a:prstDash val="solid"/>
+            <a:miter lim="800000"/>
+          </a:ln>
+          <a:effectLst/>
+        </p:spPr>
+        <p:txBody>
+          <a:bodyPr lIns="0" rIns="0" rtlCol="0" anchor="ctr"/>
+          <a:lstStyle/>
+          <a:p>
+            <a:pPr algn="ctr" defTabSz="1219170">
+              <a:defRPr/>
+            </a:pPr>
+            <a:endParaRPr lang="en-US" sz="1867" kern="0" dirty="0">
+              <a:solidFill>
+                <a:prstClr val="white"/>
+              </a:solidFill>
+              <a:latin typeface="Calibri" panose="020F0502020204030204"/>
+            </a:endParaRPr>
+          </a:p>
+        </p:txBody>
+      </p:sp>
+      <p:sp>
+        <p:nvSpPr>
+          <p:cNvPr id="2" name="Rectangle 1">
+            <a:extLst>
+              <a:ext uri="{FF2B5EF4-FFF2-40B4-BE49-F238E27FC236}">
+                <a16:creationId xmlns:a16="http://schemas.microsoft.com/office/drawing/2014/main" id="{2F47D08F-1A14-F848-9039-CE66F6A7FB68}"/>
+              </a:ext>
+            </a:extLst>
+          </p:cNvPr>
+          <p:cNvSpPr/>
+          <p:nvPr/>
+        </p:nvSpPr>
+        <p:spPr>
+          <a:xfrm>
+            <a:off x="3114321" y="4060309"/>
+            <a:ext cx="861133" cy="369332"/>
+          </a:xfrm>
+          <a:prstGeom prst="rect">
+            <a:avLst/>
+          </a:prstGeom>
+        </p:spPr>
+        <p:txBody>
+          <a:bodyPr wrap="none">
+            <a:spAutoFit/>
+          </a:bodyPr>
+          <a:lstStyle/>
+          <a:p>
+            <a:r>
+              <a:rPr lang="en-US" kern="0" dirty="0">
+                <a:solidFill>
+                  <a:prstClr val="white"/>
+                </a:solidFill>
+              </a:rPr>
+              <a:t>System</a:t>
+            </a:r>
+            <a:endParaRPr lang="en-US" dirty="0"/>
+          </a:p>
+        </p:txBody>
+      </p:sp>
+      <p:pic>
+        <p:nvPicPr>
+          <p:cNvPr id="4" name="Picture 3">
+            <a:extLst>
+              <a:ext uri="{FF2B5EF4-FFF2-40B4-BE49-F238E27FC236}">
+                <a16:creationId xmlns:a16="http://schemas.microsoft.com/office/drawing/2014/main" id="{25513212-BEF3-4140-9245-9CF7F0B1F37E}"/>
+              </a:ext>
+            </a:extLst>
+          </p:cNvPr>
+          <p:cNvPicPr>
+            <a:picLocks noChangeAspect="1"/>
+          </p:cNvPicPr>
+          <p:nvPr/>
+        </p:nvPicPr>
+        <p:blipFill>
+          <a:blip r:embed="rId6"/>
+          <a:stretch>
+            <a:fillRect/>
+          </a:stretch>
+        </p:blipFill>
+        <p:spPr>
+          <a:xfrm>
+            <a:off x="5046900" y="3225658"/>
+            <a:ext cx="1631970" cy="378243"/>
+          </a:xfrm>
+          <a:prstGeom prst="rect">
+            <a:avLst/>
+          </a:prstGeom>
+        </p:spPr>
+      </p:pic>
+    </p:spTree>
+    <p:extLst>
+      <p:ext uri="{BB962C8B-B14F-4D97-AF65-F5344CB8AC3E}">
+        <p14:creationId xmlns:p14="http://schemas.microsoft.com/office/powerpoint/2010/main" val="3505215964"/>
+      </p:ext>
+    </p:extLst>
+  </p:cSld>
+  <p:clrMapOvr>
+    <a:masterClrMapping/>
+  </p:clrMapOvr>
+</p:sld>
+</file>
+
 <file path=ppt/theme/theme1.xml><?xml version="1.0" encoding="utf-8"?>
 <a:theme xmlns:a="http://schemas.openxmlformats.org/drawingml/2006/main" name="Office Theme">
   <a:themeElements>

</xml_diff>